<commit_message>
inital idea are there
</commit_message>
<xml_diff>
--- a/Product&Taxonomy BRD/ProductInformationArchitecture.pptx
+++ b/Product&Taxonomy BRD/ProductInformationArchitecture.pptx
@@ -13,10 +13,10 @@
     <p:sldId id="306" r:id="rId7"/>
     <p:sldId id="301" r:id="rId8"/>
     <p:sldId id="303" r:id="rId9"/>
-    <p:sldId id="310" r:id="rId10"/>
-    <p:sldId id="304" r:id="rId11"/>
-    <p:sldId id="308" r:id="rId12"/>
-    <p:sldId id="309" r:id="rId13"/>
+    <p:sldId id="304" r:id="rId10"/>
+    <p:sldId id="308" r:id="rId11"/>
+    <p:sldId id="309" r:id="rId12"/>
+    <p:sldId id="310" r:id="rId13"/>
     <p:sldId id="307" r:id="rId14"/>
     <p:sldId id="302" r:id="rId15"/>
   </p:sldIdLst>
@@ -131,10 +131,10 @@
             <p14:sldId id="306"/>
             <p14:sldId id="301"/>
             <p14:sldId id="303"/>
-            <p14:sldId id="310"/>
             <p14:sldId id="304"/>
             <p14:sldId id="308"/>
             <p14:sldId id="309"/>
+            <p14:sldId id="310"/>
             <p14:sldId id="307"/>
             <p14:sldId id="302"/>
           </p14:sldIdLst>
@@ -30404,7 +30404,7 @@
         </p:nvSpPr>
         <p:spPr>
           <a:xfrm>
-            <a:off x="3015191" y="3141907"/>
+            <a:off x="3736551" y="3141907"/>
             <a:ext cx="5428055" cy="3147851"/>
           </a:xfrm>
           <a:custGeom>
@@ -30689,7 +30689,7 @@
         </p:nvSpPr>
         <p:spPr>
           <a:xfrm>
-            <a:off x="4773359" y="5211145"/>
+            <a:off x="5494719" y="5211145"/>
             <a:ext cx="2058480" cy="1094301"/>
           </a:xfrm>
           <a:custGeom>
@@ -30808,7 +30808,7 @@
         </p:nvSpPr>
         <p:spPr>
           <a:xfrm>
-            <a:off x="4627906" y="5673481"/>
+            <a:off x="5349266" y="5673481"/>
             <a:ext cx="512265" cy="512265"/>
           </a:xfrm>
           <a:prstGeom prst="ellipse">
@@ -30864,7 +30864,7 @@
         </p:nvSpPr>
         <p:spPr>
           <a:xfrm>
-            <a:off x="4918865" y="5156234"/>
+            <a:off x="5640225" y="5156234"/>
             <a:ext cx="523147" cy="523147"/>
           </a:xfrm>
           <a:prstGeom prst="ellipse">
@@ -30922,7 +30922,7 @@
         </p:nvSpPr>
         <p:spPr>
           <a:xfrm>
-            <a:off x="5545043" y="4953774"/>
+            <a:off x="6266403" y="4953774"/>
             <a:ext cx="447383" cy="447383"/>
           </a:xfrm>
           <a:prstGeom prst="ellipse">
@@ -30987,7 +30987,7 @@
         </p:nvSpPr>
         <p:spPr>
           <a:xfrm>
-            <a:off x="6177615" y="5126574"/>
+            <a:off x="6898975" y="5126574"/>
             <a:ext cx="507271" cy="507271"/>
           </a:xfrm>
           <a:prstGeom prst="ellipse">
@@ -31041,7 +31041,7 @@
         </p:nvSpPr>
         <p:spPr>
           <a:xfrm>
-            <a:off x="6513149" y="5624808"/>
+            <a:off x="7234509" y="5624808"/>
             <a:ext cx="496873" cy="496873"/>
           </a:xfrm>
           <a:prstGeom prst="ellipse">
@@ -31095,7 +31095,7 @@
         </p:nvSpPr>
         <p:spPr>
           <a:xfrm>
-            <a:off x="4956343" y="5376634"/>
+            <a:off x="5677703" y="5376634"/>
             <a:ext cx="1716515" cy="823437"/>
           </a:xfrm>
           <a:custGeom>
@@ -31236,7 +31236,7 @@
         </p:nvSpPr>
         <p:spPr>
           <a:xfrm>
-            <a:off x="2904566" y="6223316"/>
+            <a:off x="3625926" y="6223316"/>
             <a:ext cx="5587252" cy="165100"/>
           </a:xfrm>
           <a:prstGeom prst="rect">
@@ -31297,7 +31297,7 @@
         </p:blipFill>
         <p:spPr>
           <a:xfrm>
-            <a:off x="4997697" y="5260428"/>
+            <a:off x="5719057" y="5260428"/>
             <a:ext cx="337365" cy="284204"/>
           </a:xfrm>
           <a:prstGeom prst="rect">
@@ -31330,7 +31330,7 @@
         </p:blipFill>
         <p:spPr>
           <a:xfrm>
-            <a:off x="5574591" y="4990581"/>
+            <a:off x="6295951" y="4990581"/>
             <a:ext cx="429140" cy="367620"/>
           </a:xfrm>
           <a:prstGeom prst="rect">
@@ -31373,7 +31373,7 @@
         </p:blipFill>
         <p:spPr>
           <a:xfrm>
-            <a:off x="6150289" y="5155737"/>
+            <a:off x="6871649" y="5155737"/>
             <a:ext cx="516842" cy="404859"/>
           </a:xfrm>
           <a:prstGeom prst="rect">
@@ -31404,7 +31404,7 @@
         </p:blipFill>
         <p:spPr>
           <a:xfrm>
-            <a:off x="4666099" y="5724754"/>
+            <a:off x="5387459" y="5724754"/>
             <a:ext cx="476720" cy="396927"/>
           </a:xfrm>
           <a:prstGeom prst="rect">
@@ -31435,7 +31435,7 @@
         </p:blipFill>
         <p:spPr>
           <a:xfrm>
-            <a:off x="6506966" y="5650995"/>
+            <a:off x="7228326" y="5650995"/>
             <a:ext cx="465864" cy="364153"/>
           </a:xfrm>
           <a:prstGeom prst="rect">
@@ -31457,7 +31457,7 @@
         </p:nvSpPr>
         <p:spPr>
           <a:xfrm>
-            <a:off x="4942390" y="2028511"/>
+            <a:off x="5663750" y="2028511"/>
             <a:ext cx="2060293" cy="1562583"/>
           </a:xfrm>
           <a:prstGeom prst="roundRect">
@@ -31526,8 +31526,8 @@
         </p:nvSpPr>
         <p:spPr>
           <a:xfrm>
-            <a:off x="1564509" y="2701772"/>
-            <a:ext cx="3080515" cy="1618528"/>
+            <a:off x="1774424" y="2407304"/>
+            <a:ext cx="3080515" cy="1975568"/>
           </a:xfrm>
           <a:prstGeom prst="roundRect">
             <a:avLst>
@@ -31595,7 +31595,7 @@
         </p:nvSpPr>
         <p:spPr>
           <a:xfrm rot="16200000">
-            <a:off x="4446606" y="2609177"/>
+            <a:off x="5167966" y="2609177"/>
             <a:ext cx="1479631" cy="403186"/>
           </a:xfrm>
           <a:prstGeom prst="roundRect">
@@ -31676,7 +31676,7 @@
         </p:blipFill>
         <p:spPr>
           <a:xfrm>
-            <a:off x="5462118" y="3048233"/>
+            <a:off x="6183478" y="3048233"/>
             <a:ext cx="429140" cy="367620"/>
           </a:xfrm>
           <a:prstGeom prst="rect">
@@ -31698,8 +31698,8 @@
         </p:nvSpPr>
         <p:spPr>
           <a:xfrm rot="16200000">
-            <a:off x="1084161" y="3274719"/>
-            <a:ext cx="1504709" cy="424406"/>
+            <a:off x="1135463" y="3138863"/>
+            <a:ext cx="1821935" cy="424406"/>
           </a:xfrm>
           <a:prstGeom prst="roundRect">
             <a:avLst/>
@@ -31768,7 +31768,7 @@
         </p:nvSpPr>
         <p:spPr>
           <a:xfrm>
-            <a:off x="5443958" y="2078671"/>
+            <a:off x="6165318" y="2078671"/>
             <a:ext cx="1479631" cy="403186"/>
           </a:xfrm>
           <a:prstGeom prst="roundRect">
@@ -31837,7 +31837,7 @@
         </p:nvSpPr>
         <p:spPr>
           <a:xfrm>
-            <a:off x="5445887" y="2532013"/>
+            <a:off x="6167247" y="2532013"/>
             <a:ext cx="1479631" cy="403186"/>
           </a:xfrm>
           <a:prstGeom prst="roundRect">
@@ -31906,7 +31906,7 @@
         </p:nvSpPr>
         <p:spPr>
           <a:xfrm>
-            <a:off x="2125772" y="2739894"/>
+            <a:off x="2335687" y="2445426"/>
             <a:ext cx="2484864" cy="378758"/>
           </a:xfrm>
           <a:prstGeom prst="roundRect">
@@ -31977,8 +31977,8 @@
         </p:nvSpPr>
         <p:spPr>
           <a:xfrm>
-            <a:off x="2126622" y="3174779"/>
-            <a:ext cx="2087765" cy="393784"/>
+            <a:off x="2336537" y="2880311"/>
+            <a:ext cx="2445379" cy="393784"/>
           </a:xfrm>
           <a:prstGeom prst="roundRect">
             <a:avLst>
@@ -32048,8 +32048,8 @@
         </p:nvSpPr>
         <p:spPr>
           <a:xfrm>
-            <a:off x="2121860" y="3622454"/>
-            <a:ext cx="2087765" cy="393784"/>
+            <a:off x="2331775" y="3327986"/>
+            <a:ext cx="2450141" cy="393784"/>
           </a:xfrm>
           <a:prstGeom prst="roundRect">
             <a:avLst>
@@ -32119,7 +32119,7 @@
         </p:nvSpPr>
         <p:spPr>
           <a:xfrm>
-            <a:off x="7305555" y="3928689"/>
+            <a:off x="8128515" y="4182689"/>
             <a:ext cx="2518929" cy="634680"/>
           </a:xfrm>
           <a:prstGeom prst="roundRect">
@@ -32212,7 +32212,7 @@
         </p:nvSpPr>
         <p:spPr>
           <a:xfrm>
-            <a:off x="7636913" y="5067405"/>
+            <a:off x="8373771" y="5163579"/>
             <a:ext cx="3032799" cy="669493"/>
           </a:xfrm>
           <a:prstGeom prst="roundRect">
@@ -32305,8 +32305,8 @@
         </p:nvSpPr>
         <p:spPr>
           <a:xfrm>
-            <a:off x="1103451" y="4474628"/>
-            <a:ext cx="3080515" cy="1618528"/>
+            <a:off x="1545841" y="4598614"/>
+            <a:ext cx="3080515" cy="1802185"/>
           </a:xfrm>
           <a:prstGeom prst="roundRect">
             <a:avLst>
@@ -32365,8 +32365,8 @@
         </p:nvSpPr>
         <p:spPr>
           <a:xfrm rot="16200000">
-            <a:off x="669400" y="5059151"/>
-            <a:ext cx="1504709" cy="424406"/>
+            <a:off x="1008486" y="5286442"/>
+            <a:ext cx="1711318" cy="424406"/>
           </a:xfrm>
           <a:prstGeom prst="roundRect">
             <a:avLst/>
@@ -32404,10 +32404,14 @@
           <a:p>
             <a:pPr algn="ctr"/>
             <a:r>
-              <a:rPr lang="en-US"/>
+              <a:rPr lang="en-US">
+                <a:latin typeface="Montserrat" pitchFamily="2" charset="77"/>
+              </a:rPr>
               <a:t>Reference </a:t>
             </a:r>
-            <a:endParaRPr lang="en-US" dirty="0"/>
+            <a:endParaRPr lang="en-US" dirty="0">
+              <a:latin typeface="Montserrat" pitchFamily="2" charset="77"/>
+            </a:endParaRPr>
           </a:p>
         </p:txBody>
       </p:sp>
@@ -32425,8 +32429,8 @@
         </p:nvSpPr>
         <p:spPr>
           <a:xfrm>
-            <a:off x="1717669" y="4518869"/>
-            <a:ext cx="2087765" cy="393784"/>
+            <a:off x="2160059" y="4642856"/>
+            <a:ext cx="2373884" cy="393784"/>
           </a:xfrm>
           <a:prstGeom prst="roundRect">
             <a:avLst>
@@ -32464,12 +32468,15 @@
           <a:bodyPr rtlCol="0" anchor="ctr"/>
           <a:lstStyle/>
           <a:p>
-            <a:pPr algn="ctr"/>
-            <a:r>
-              <a:rPr lang="en-US"/>
+            <a:r>
+              <a:rPr lang="en-US">
+                <a:latin typeface="Montserrat" pitchFamily="2" charset="77"/>
+              </a:rPr>
               <a:t>IATA Stations</a:t>
             </a:r>
-            <a:endParaRPr lang="en-US" dirty="0"/>
+            <a:endParaRPr lang="en-US" dirty="0">
+              <a:latin typeface="Montserrat" pitchFamily="2" charset="77"/>
+            </a:endParaRPr>
           </a:p>
         </p:txBody>
       </p:sp>
@@ -32487,8 +32494,8 @@
         </p:nvSpPr>
         <p:spPr>
           <a:xfrm>
-            <a:off x="1728082" y="4972283"/>
-            <a:ext cx="2087765" cy="393784"/>
+            <a:off x="2170472" y="5080772"/>
+            <a:ext cx="2347973" cy="393784"/>
           </a:xfrm>
           <a:prstGeom prst="roundRect">
             <a:avLst>
@@ -32526,9 +32533,10 @@
           <a:bodyPr rtlCol="0" anchor="ctr"/>
           <a:lstStyle/>
           <a:p>
-            <a:pPr algn="ctr"/>
-            <a:r>
-              <a:rPr lang="en-US" dirty="0"/>
+            <a:r>
+              <a:rPr lang="en-US" dirty="0">
+                <a:latin typeface="Montserrat" pitchFamily="2" charset="77"/>
+              </a:rPr>
               <a:t>UIC Stations</a:t>
             </a:r>
           </a:p>
@@ -32548,8 +32556,8 @@
         </p:nvSpPr>
         <p:spPr>
           <a:xfrm>
-            <a:off x="1727135" y="5431376"/>
-            <a:ext cx="2225799" cy="393784"/>
+            <a:off x="2169525" y="5524367"/>
+            <a:ext cx="2333421" cy="393784"/>
           </a:xfrm>
           <a:prstGeom prst="roundRect">
             <a:avLst>
@@ -32587,12 +32595,12 @@
           <a:bodyPr rtlCol="0" anchor="ctr"/>
           <a:lstStyle/>
           <a:p>
-            <a:pPr algn="ctr"/>
-            <a:r>
-              <a:rPr lang="en-US"/>
+            <a:r>
+              <a:rPr lang="en-US" dirty="0">
+                <a:latin typeface="Montserrat" pitchFamily="2" charset="77"/>
+              </a:rPr>
               <a:t>ISO 80000 Metric</a:t>
             </a:r>
-            <a:endParaRPr lang="en-US" dirty="0"/>
           </a:p>
         </p:txBody>
       </p:sp>
@@ -32619,8 +32627,8 @@
         </p:blipFill>
         <p:spPr>
           <a:xfrm>
-            <a:off x="4256962" y="3924269"/>
-            <a:ext cx="337365" cy="284204"/>
+            <a:off x="1336219" y="2110967"/>
+            <a:ext cx="748992" cy="630968"/>
           </a:xfrm>
           <a:prstGeom prst="rect">
             <a:avLst/>
@@ -32650,8 +32658,8 @@
         </p:blipFill>
         <p:spPr>
           <a:xfrm>
-            <a:off x="3670182" y="5590075"/>
-            <a:ext cx="476720" cy="396927"/>
+            <a:off x="1090402" y="4288218"/>
+            <a:ext cx="899246" cy="748731"/>
           </a:xfrm>
           <a:prstGeom prst="rect">
             <a:avLst/>
@@ -32681,8 +32689,8 @@
         </p:blipFill>
         <p:spPr>
           <a:xfrm>
-            <a:off x="7692517" y="5425044"/>
-            <a:ext cx="321326" cy="251172"/>
+            <a:off x="10847111" y="4743119"/>
+            <a:ext cx="893544" cy="698460"/>
           </a:xfrm>
           <a:prstGeom prst="rect">
             <a:avLst/>
@@ -32724,8 +32732,8 @@
         </p:blipFill>
         <p:spPr>
           <a:xfrm>
-            <a:off x="7281602" y="3929490"/>
-            <a:ext cx="398962" cy="312520"/>
+            <a:off x="10126746" y="3729734"/>
+            <a:ext cx="886006" cy="694038"/>
           </a:xfrm>
           <a:prstGeom prst="rect">
             <a:avLst/>
@@ -32742,15 +32750,15 @@
             </a:extLst>
           </p:cNvPr>
           <p:cNvCxnSpPr>
-            <a:stCxn id="25" idx="2"/>
+            <a:cxnSpLocks/>
             <a:endCxn id="10" idx="0"/>
           </p:cNvCxnSpPr>
           <p:nvPr/>
         </p:nvCxnSpPr>
         <p:spPr>
-          <a:xfrm flipH="1">
-            <a:off x="5768735" y="3591094"/>
-            <a:ext cx="203802" cy="1362680"/>
+          <a:xfrm>
+            <a:off x="6490095" y="3595607"/>
+            <a:ext cx="0" cy="1358167"/>
           </a:xfrm>
           <a:prstGeom prst="straightConnector1">
             <a:avLst/>
@@ -32786,14 +32794,13 @@
           <p:cNvCxnSpPr>
             <a:cxnSpLocks/>
             <a:stCxn id="36" idx="1"/>
-            <a:endCxn id="11" idx="0"/>
           </p:cNvCxnSpPr>
           <p:nvPr/>
         </p:nvCxnSpPr>
         <p:spPr>
           <a:xfrm flipH="1">
-            <a:off x="6431251" y="4246029"/>
-            <a:ext cx="874304" cy="880545"/>
+            <a:off x="7335520" y="4500029"/>
+            <a:ext cx="792995" cy="712051"/>
           </a:xfrm>
           <a:prstGeom prst="straightConnector1">
             <a:avLst/>
@@ -32835,8 +32842,8 @@
         </p:nvCxnSpPr>
         <p:spPr>
           <a:xfrm flipH="1">
-            <a:off x="6972830" y="5402152"/>
-            <a:ext cx="664083" cy="430920"/>
+            <a:off x="7694190" y="5498326"/>
+            <a:ext cx="679581" cy="334746"/>
           </a:xfrm>
           <a:prstGeom prst="straightConnector1">
             <a:avLst/>
@@ -32871,15 +32878,14 @@
           </p:cNvPr>
           <p:cNvCxnSpPr>
             <a:cxnSpLocks/>
-            <a:stCxn id="27" idx="3"/>
             <a:endCxn id="9" idx="0"/>
           </p:cNvCxnSpPr>
           <p:nvPr/>
         </p:nvCxnSpPr>
         <p:spPr>
           <a:xfrm>
-            <a:off x="4645024" y="3511036"/>
-            <a:ext cx="535415" cy="1645198"/>
+            <a:off x="4828411" y="3905573"/>
+            <a:ext cx="1073388" cy="1250661"/>
           </a:xfrm>
           <a:prstGeom prst="straightConnector1">
             <a:avLst/>
@@ -32914,15 +32920,14 @@
           </p:cNvPr>
           <p:cNvCxnSpPr>
             <a:cxnSpLocks/>
-            <a:stCxn id="38" idx="3"/>
             <a:endCxn id="8" idx="2"/>
           </p:cNvCxnSpPr>
           <p:nvPr/>
         </p:nvCxnSpPr>
         <p:spPr>
           <a:xfrm>
-            <a:off x="4183966" y="5283892"/>
-            <a:ext cx="443940" cy="645722"/>
+            <a:off x="4564940" y="5749871"/>
+            <a:ext cx="784326" cy="179743"/>
           </a:xfrm>
           <a:prstGeom prst="straightConnector1">
             <a:avLst/>
@@ -32946,6 +32951,359 @@
           </a:fontRef>
         </p:style>
       </p:cxnSp>
+      <p:sp>
+        <p:nvSpPr>
+          <p:cNvPr id="72" name="Rectangle : coins arrondis 71">
+            <a:extLst>
+              <a:ext uri="{FF2B5EF4-FFF2-40B4-BE49-F238E27FC236}">
+                <a16:creationId xmlns:a16="http://schemas.microsoft.com/office/drawing/2014/main" id="{1A074486-B5CC-4C20-D28A-47A946FB8B7B}"/>
+              </a:ext>
+            </a:extLst>
+          </p:cNvPr>
+          <p:cNvSpPr/>
+          <p:nvPr/>
+        </p:nvSpPr>
+        <p:spPr>
+          <a:xfrm>
+            <a:off x="2329192" y="3790352"/>
+            <a:ext cx="2437226" cy="393784"/>
+          </a:xfrm>
+          <a:prstGeom prst="roundRect">
+            <a:avLst>
+              <a:gd name="adj" fmla="val 14556"/>
+            </a:avLst>
+          </a:prstGeom>
+          <a:solidFill>
+            <a:schemeClr val="accent2">
+              <a:lumMod val="50000"/>
+            </a:schemeClr>
+          </a:solidFill>
+          <a:ln>
+            <a:solidFill>
+              <a:schemeClr val="bg2">
+                <a:lumMod val="50000"/>
+              </a:schemeClr>
+            </a:solidFill>
+          </a:ln>
+          <a:effectLst>
+            <a:outerShdw blurRad="50800" dist="38100" dir="2700000" algn="tl" rotWithShape="0">
+              <a:prstClr val="black">
+                <a:alpha val="40000"/>
+              </a:prstClr>
+            </a:outerShdw>
+          </a:effectLst>
+        </p:spPr>
+        <p:style>
+          <a:lnRef idx="2">
+            <a:schemeClr val="accent1">
+              <a:shade val="15000"/>
+            </a:schemeClr>
+          </a:lnRef>
+          <a:fillRef idx="1">
+            <a:schemeClr val="accent1"/>
+          </a:fillRef>
+          <a:effectRef idx="0">
+            <a:schemeClr val="accent1"/>
+          </a:effectRef>
+          <a:fontRef idx="minor">
+            <a:schemeClr val="lt1"/>
+          </a:fontRef>
+        </p:style>
+        <p:txBody>
+          <a:bodyPr rtlCol="0" anchor="ctr"/>
+          <a:lstStyle/>
+          <a:p>
+            <a:r>
+              <a:rPr lang="en-US" dirty="0">
+                <a:latin typeface="Montserrat" pitchFamily="2" charset="77"/>
+              </a:rPr>
+              <a:t>…</a:t>
+            </a:r>
+          </a:p>
+        </p:txBody>
+      </p:sp>
+      <p:sp>
+        <p:nvSpPr>
+          <p:cNvPr id="73" name="Rectangle : coins arrondis 72">
+            <a:extLst>
+              <a:ext uri="{FF2B5EF4-FFF2-40B4-BE49-F238E27FC236}">
+                <a16:creationId xmlns:a16="http://schemas.microsoft.com/office/drawing/2014/main" id="{860DC665-CF87-5BBE-E4F5-18B58062A232}"/>
+              </a:ext>
+            </a:extLst>
+          </p:cNvPr>
+          <p:cNvSpPr/>
+          <p:nvPr/>
+        </p:nvSpPr>
+        <p:spPr>
+          <a:xfrm>
+            <a:off x="2135945" y="5971234"/>
+            <a:ext cx="2382500" cy="367573"/>
+          </a:xfrm>
+          <a:prstGeom prst="roundRect">
+            <a:avLst>
+              <a:gd name="adj" fmla="val 14556"/>
+            </a:avLst>
+          </a:prstGeom>
+          <a:ln>
+            <a:noFill/>
+          </a:ln>
+          <a:effectLst>
+            <a:outerShdw blurRad="50800" dist="38100" dir="2700000" algn="tl" rotWithShape="0">
+              <a:prstClr val="black">
+                <a:alpha val="40000"/>
+              </a:prstClr>
+            </a:outerShdw>
+          </a:effectLst>
+        </p:spPr>
+        <p:style>
+          <a:lnRef idx="2">
+            <a:schemeClr val="accent1">
+              <a:shade val="15000"/>
+            </a:schemeClr>
+          </a:lnRef>
+          <a:fillRef idx="1">
+            <a:schemeClr val="accent1"/>
+          </a:fillRef>
+          <a:effectRef idx="0">
+            <a:schemeClr val="accent1"/>
+          </a:effectRef>
+          <a:fontRef idx="minor">
+            <a:schemeClr val="lt1"/>
+          </a:fontRef>
+        </p:style>
+        <p:txBody>
+          <a:bodyPr rtlCol="0" anchor="ctr"/>
+          <a:lstStyle/>
+          <a:p>
+            <a:r>
+              <a:rPr lang="en-US" dirty="0">
+                <a:latin typeface="Montserrat" pitchFamily="2" charset="77"/>
+              </a:rPr>
+              <a:t>…</a:t>
+            </a:r>
+          </a:p>
+        </p:txBody>
+      </p:sp>
+      <p:sp>
+        <p:nvSpPr>
+          <p:cNvPr id="74" name="Rectangle : coins arrondis 73">
+            <a:extLst>
+              <a:ext uri="{FF2B5EF4-FFF2-40B4-BE49-F238E27FC236}">
+                <a16:creationId xmlns:a16="http://schemas.microsoft.com/office/drawing/2014/main" id="{4E66422B-4DF8-F728-2EE6-F6B510159D1D}"/>
+              </a:ext>
+            </a:extLst>
+          </p:cNvPr>
+          <p:cNvSpPr/>
+          <p:nvPr/>
+        </p:nvSpPr>
+        <p:spPr>
+          <a:xfrm>
+            <a:off x="6180163" y="3009876"/>
+            <a:ext cx="1479631" cy="403186"/>
+          </a:xfrm>
+          <a:prstGeom prst="roundRect">
+            <a:avLst/>
+          </a:prstGeom>
+          <a:solidFill>
+            <a:schemeClr val="accent2">
+              <a:lumMod val="75000"/>
+            </a:schemeClr>
+          </a:solidFill>
+          <a:ln>
+            <a:solidFill>
+              <a:schemeClr val="bg2">
+                <a:lumMod val="25000"/>
+              </a:schemeClr>
+            </a:solidFill>
+          </a:ln>
+          <a:effectLst>
+            <a:outerShdw blurRad="50800" dist="38100" dir="2700000" algn="tl" rotWithShape="0">
+              <a:prstClr val="black">
+                <a:alpha val="40000"/>
+              </a:prstClr>
+            </a:outerShdw>
+          </a:effectLst>
+        </p:spPr>
+        <p:style>
+          <a:lnRef idx="2">
+            <a:schemeClr val="accent1">
+              <a:shade val="15000"/>
+            </a:schemeClr>
+          </a:lnRef>
+          <a:fillRef idx="1">
+            <a:schemeClr val="accent1"/>
+          </a:fillRef>
+          <a:effectRef idx="0">
+            <a:schemeClr val="accent1"/>
+          </a:effectRef>
+          <a:fontRef idx="minor">
+            <a:schemeClr val="lt1"/>
+          </a:fontRef>
+        </p:style>
+        <p:txBody>
+          <a:bodyPr rtlCol="0" anchor="ctr"/>
+          <a:lstStyle/>
+          <a:p>
+            <a:r>
+              <a:rPr lang="en-US" dirty="0">
+                <a:latin typeface="Montserrat" pitchFamily="2" charset="77"/>
+              </a:rPr>
+              <a:t>…</a:t>
+            </a:r>
+          </a:p>
+        </p:txBody>
+      </p:sp>
+      <p:pic>
+        <p:nvPicPr>
+          <p:cNvPr id="75" name="Image 74">
+            <a:extLst>
+              <a:ext uri="{FF2B5EF4-FFF2-40B4-BE49-F238E27FC236}">
+                <a16:creationId xmlns:a16="http://schemas.microsoft.com/office/drawing/2014/main" id="{223415CE-916E-EB8D-76B6-EB6186BED97A}"/>
+              </a:ext>
+            </a:extLst>
+          </p:cNvPr>
+          <p:cNvPicPr>
+            <a:picLocks noChangeAspect="1"/>
+          </p:cNvPicPr>
+          <p:nvPr/>
+        </p:nvPicPr>
+        <p:blipFill>
+          <a:blip r:embed="rId3"/>
+          <a:srcRect b="14335"/>
+          <a:stretch>
+            <a:fillRect/>
+          </a:stretch>
+        </p:blipFill>
+        <p:spPr>
+          <a:xfrm>
+            <a:off x="7279403" y="1795863"/>
+            <a:ext cx="853187" cy="730877"/>
+          </a:xfrm>
+          <a:prstGeom prst="rect">
+            <a:avLst/>
+          </a:prstGeom>
+        </p:spPr>
+      </p:pic>
+      <p:sp>
+        <p:nvSpPr>
+          <p:cNvPr id="76" name="Triangle 75">
+            <a:extLst>
+              <a:ext uri="{FF2B5EF4-FFF2-40B4-BE49-F238E27FC236}">
+                <a16:creationId xmlns:a16="http://schemas.microsoft.com/office/drawing/2014/main" id="{F44E6015-0E75-618D-6FBF-8DDE2608ADE3}"/>
+              </a:ext>
+            </a:extLst>
+          </p:cNvPr>
+          <p:cNvSpPr/>
+          <p:nvPr/>
+        </p:nvSpPr>
+        <p:spPr>
+          <a:xfrm rot="3555402">
+            <a:off x="5076383" y="3239147"/>
+            <a:ext cx="433953" cy="356461"/>
+          </a:xfrm>
+          <a:prstGeom prst="triangle">
+            <a:avLst/>
+          </a:prstGeom>
+          <a:solidFill>
+            <a:schemeClr val="accent4">
+              <a:lumMod val="75000"/>
+            </a:schemeClr>
+          </a:solidFill>
+          <a:ln w="101600">
+            <a:solidFill>
+              <a:schemeClr val="accent1">
+                <a:shade val="15000"/>
+              </a:schemeClr>
+            </a:solidFill>
+          </a:ln>
+        </p:spPr>
+        <p:style>
+          <a:lnRef idx="2">
+            <a:schemeClr val="accent1">
+              <a:shade val="15000"/>
+            </a:schemeClr>
+          </a:lnRef>
+          <a:fillRef idx="1">
+            <a:schemeClr val="accent1"/>
+          </a:fillRef>
+          <a:effectRef idx="0">
+            <a:schemeClr val="accent1"/>
+          </a:effectRef>
+          <a:fontRef idx="minor">
+            <a:schemeClr val="lt1"/>
+          </a:fontRef>
+        </p:style>
+        <p:txBody>
+          <a:bodyPr wrap="square" rtlCol="0" anchor="ctr">
+            <a:noAutofit/>
+          </a:bodyPr>
+          <a:lstStyle/>
+          <a:p>
+            <a:pPr algn="ctr"/>
+            <a:endParaRPr lang="en-US"/>
+          </a:p>
+        </p:txBody>
+      </p:sp>
+      <p:sp>
+        <p:nvSpPr>
+          <p:cNvPr id="77" name="Triangle 76">
+            <a:extLst>
+              <a:ext uri="{FF2B5EF4-FFF2-40B4-BE49-F238E27FC236}">
+                <a16:creationId xmlns:a16="http://schemas.microsoft.com/office/drawing/2014/main" id="{715B34A7-82FF-6DEA-AAE9-960DB1BCED13}"/>
+              </a:ext>
+            </a:extLst>
+          </p:cNvPr>
+          <p:cNvSpPr/>
+          <p:nvPr/>
+        </p:nvSpPr>
+        <p:spPr>
+          <a:xfrm rot="11659528">
+            <a:off x="7900862" y="3625227"/>
+            <a:ext cx="433953" cy="356461"/>
+          </a:xfrm>
+          <a:prstGeom prst="triangle">
+            <a:avLst/>
+          </a:prstGeom>
+          <a:solidFill>
+            <a:schemeClr val="accent4">
+              <a:lumMod val="75000"/>
+            </a:schemeClr>
+          </a:solidFill>
+          <a:ln w="101600">
+            <a:solidFill>
+              <a:schemeClr val="accent1">
+                <a:shade val="15000"/>
+              </a:schemeClr>
+            </a:solidFill>
+          </a:ln>
+        </p:spPr>
+        <p:style>
+          <a:lnRef idx="2">
+            <a:schemeClr val="accent1">
+              <a:shade val="15000"/>
+            </a:schemeClr>
+          </a:lnRef>
+          <a:fillRef idx="1">
+            <a:schemeClr val="accent1"/>
+          </a:fillRef>
+          <a:effectRef idx="0">
+            <a:schemeClr val="accent1"/>
+          </a:effectRef>
+          <a:fontRef idx="minor">
+            <a:schemeClr val="lt1"/>
+          </a:fontRef>
+        </p:style>
+        <p:txBody>
+          <a:bodyPr wrap="square" rtlCol="0" anchor="ctr">
+            <a:noAutofit/>
+          </a:bodyPr>
+          <a:lstStyle/>
+          <a:p>
+            <a:pPr algn="ctr"/>
+            <a:endParaRPr lang="en-US"/>
+          </a:p>
+        </p:txBody>
+      </p:sp>
     </p:spTree>
     <p:extLst>
       <p:ext uri="{BB962C8B-B14F-4D97-AF65-F5344CB8AC3E}">
@@ -32960,6 +33318,553 @@
 </file>
 
 <file path=ppt/slides/slide6.xml><?xml version="1.0" encoding="utf-8"?>
+<p:sld xmlns:a="http://schemas.openxmlformats.org/drawingml/2006/main" xmlns:r="http://schemas.openxmlformats.org/officeDocument/2006/relationships" xmlns:p="http://schemas.openxmlformats.org/presentationml/2006/main">
+  <p:cSld>
+    <p:spTree>
+      <p:nvGrpSpPr>
+        <p:cNvPr id="1" name="">
+          <a:extLst>
+            <a:ext uri="{FF2B5EF4-FFF2-40B4-BE49-F238E27FC236}">
+              <a16:creationId xmlns:a16="http://schemas.microsoft.com/office/drawing/2014/main" id="{457ED318-2E00-08A3-F6CD-30754C3FAFF3}"/>
+            </a:ext>
+          </a:extLst>
+        </p:cNvPr>
+        <p:cNvGrpSpPr/>
+        <p:nvPr/>
+      </p:nvGrpSpPr>
+      <p:grpSpPr>
+        <a:xfrm>
+          <a:off x="0" y="0"/>
+          <a:ext cx="0" cy="0"/>
+          <a:chOff x="0" y="0"/>
+          <a:chExt cx="0" cy="0"/>
+        </a:xfrm>
+      </p:grpSpPr>
+      <p:sp>
+        <p:nvSpPr>
+          <p:cNvPr id="6" name="Ellipse 5">
+            <a:extLst>
+              <a:ext uri="{FF2B5EF4-FFF2-40B4-BE49-F238E27FC236}">
+                <a16:creationId xmlns:a16="http://schemas.microsoft.com/office/drawing/2014/main" id="{88C0F3DE-D9B9-5F05-216B-79FA3DFC51DA}"/>
+              </a:ext>
+            </a:extLst>
+          </p:cNvPr>
+          <p:cNvSpPr/>
+          <p:nvPr/>
+        </p:nvSpPr>
+        <p:spPr>
+          <a:xfrm>
+            <a:off x="65856" y="269031"/>
+            <a:ext cx="1104929" cy="1056855"/>
+          </a:xfrm>
+          <a:prstGeom prst="ellipse">
+            <a:avLst/>
+          </a:prstGeom>
+          <a:solidFill>
+            <a:schemeClr val="accent2">
+              <a:lumMod val="25000"/>
+              <a:alpha val="70000"/>
+            </a:schemeClr>
+          </a:solidFill>
+          <a:ln>
+            <a:noFill/>
+          </a:ln>
+        </p:spPr>
+        <p:style>
+          <a:lnRef idx="2">
+            <a:schemeClr val="accent1">
+              <a:shade val="15000"/>
+            </a:schemeClr>
+          </a:lnRef>
+          <a:fillRef idx="1">
+            <a:schemeClr val="accent1"/>
+          </a:fillRef>
+          <a:effectRef idx="0">
+            <a:schemeClr val="accent1"/>
+          </a:effectRef>
+          <a:fontRef idx="minor">
+            <a:schemeClr val="lt1"/>
+          </a:fontRef>
+        </p:style>
+        <p:txBody>
+          <a:bodyPr rtlCol="0" anchor="ctr"/>
+          <a:lstStyle/>
+          <a:p>
+            <a:pPr algn="ctr"/>
+            <a:r>
+              <a:rPr lang="en-US" sz="4400" b="1" dirty="0">
+                <a:latin typeface="Montserrat" pitchFamily="2" charset="77"/>
+              </a:rPr>
+              <a:t>3</a:t>
+            </a:r>
+          </a:p>
+        </p:txBody>
+      </p:sp>
+      <p:sp>
+        <p:nvSpPr>
+          <p:cNvPr id="5" name="Espace réservé du texte 2">
+            <a:extLst>
+              <a:ext uri="{FF2B5EF4-FFF2-40B4-BE49-F238E27FC236}">
+                <a16:creationId xmlns:a16="http://schemas.microsoft.com/office/drawing/2014/main" id="{6863199F-888A-DCDC-DF7F-1A8A898E309D}"/>
+              </a:ext>
+            </a:extLst>
+          </p:cNvPr>
+          <p:cNvSpPr>
+            <a:spLocks noGrp="1"/>
+          </p:cNvSpPr>
+          <p:nvPr>
+            <p:ph type="body" sz="quarter" idx="14"/>
+          </p:nvPr>
+        </p:nvSpPr>
+        <p:spPr>
+          <a:xfrm>
+            <a:off x="842542" y="334748"/>
+            <a:ext cx="8555058" cy="923925"/>
+          </a:xfrm>
+        </p:spPr>
+        <p:txBody>
+          <a:bodyPr/>
+          <a:lstStyle/>
+          <a:p>
+            <a:r>
+              <a:rPr lang="en-US" dirty="0">
+                <a:solidFill>
+                  <a:srgbClr val="002060"/>
+                </a:solidFill>
+              </a:rPr>
+              <a:t>Product management Information </a:t>
+            </a:r>
+            <a:br>
+              <a:rPr lang="en-US" dirty="0">
+                <a:solidFill>
+                  <a:srgbClr val="002060"/>
+                </a:solidFill>
+              </a:rPr>
+            </a:br>
+            <a:r>
+              <a:rPr lang="en-US" sz="2400" dirty="0">
+                <a:solidFill>
+                  <a:srgbClr val="002060"/>
+                </a:solidFill>
+              </a:rPr>
+              <a:t>Concrete Product</a:t>
+            </a:r>
+            <a:endParaRPr lang="en-US" dirty="0">
+              <a:solidFill>
+                <a:srgbClr val="002060"/>
+              </a:solidFill>
+            </a:endParaRPr>
+          </a:p>
+        </p:txBody>
+      </p:sp>
+      <p:sp>
+        <p:nvSpPr>
+          <p:cNvPr id="4" name="ZoneTexte 3">
+            <a:extLst>
+              <a:ext uri="{FF2B5EF4-FFF2-40B4-BE49-F238E27FC236}">
+                <a16:creationId xmlns:a16="http://schemas.microsoft.com/office/drawing/2014/main" id="{D5C23778-451B-DB4D-1518-74662329E61C}"/>
+              </a:ext>
+            </a:extLst>
+          </p:cNvPr>
+          <p:cNvSpPr txBox="1"/>
+          <p:nvPr/>
+        </p:nvSpPr>
+        <p:spPr>
+          <a:xfrm>
+            <a:off x="3130566" y="2444059"/>
+            <a:ext cx="5070683" cy="646331"/>
+          </a:xfrm>
+          <a:prstGeom prst="rect">
+            <a:avLst/>
+          </a:prstGeom>
+          <a:noFill/>
+        </p:spPr>
+        <p:txBody>
+          <a:bodyPr wrap="none" rtlCol="0">
+            <a:spAutoFit/>
+          </a:bodyPr>
+          <a:lstStyle/>
+          <a:p>
+            <a:r>
+              <a:rPr lang="en-US" dirty="0"/>
+              <a:t>Transport product</a:t>
+            </a:r>
+          </a:p>
+          <a:p>
+            <a:r>
+              <a:rPr lang="en-US" dirty="0"/>
+              <a:t>CDG – YUL use the features from the 124 ticket</a:t>
+            </a:r>
+          </a:p>
+        </p:txBody>
+      </p:sp>
+    </p:spTree>
+    <p:extLst>
+      <p:ext uri="{BB962C8B-B14F-4D97-AF65-F5344CB8AC3E}">
+        <p14:creationId xmlns:p14="http://schemas.microsoft.com/office/powerpoint/2010/main" val="1819057470"/>
+      </p:ext>
+    </p:extLst>
+  </p:cSld>
+  <p:clrMapOvr>
+    <a:masterClrMapping/>
+  </p:clrMapOvr>
+</p:sld>
+</file>
+
+<file path=ppt/slides/slide7.xml><?xml version="1.0" encoding="utf-8"?>
+<p:sld xmlns:a="http://schemas.openxmlformats.org/drawingml/2006/main" xmlns:r="http://schemas.openxmlformats.org/officeDocument/2006/relationships" xmlns:p="http://schemas.openxmlformats.org/presentationml/2006/main">
+  <p:cSld>
+    <p:spTree>
+      <p:nvGrpSpPr>
+        <p:cNvPr id="1" name="">
+          <a:extLst>
+            <a:ext uri="{FF2B5EF4-FFF2-40B4-BE49-F238E27FC236}">
+              <a16:creationId xmlns:a16="http://schemas.microsoft.com/office/drawing/2014/main" id="{7F5272A3-82BA-5D2E-84C3-EA6BBBAE79F6}"/>
+            </a:ext>
+          </a:extLst>
+        </p:cNvPr>
+        <p:cNvGrpSpPr/>
+        <p:nvPr/>
+      </p:nvGrpSpPr>
+      <p:grpSpPr>
+        <a:xfrm>
+          <a:off x="0" y="0"/>
+          <a:ext cx="0" cy="0"/>
+          <a:chOff x="0" y="0"/>
+          <a:chExt cx="0" cy="0"/>
+        </a:xfrm>
+      </p:grpSpPr>
+      <p:sp>
+        <p:nvSpPr>
+          <p:cNvPr id="6" name="Ellipse 5">
+            <a:extLst>
+              <a:ext uri="{FF2B5EF4-FFF2-40B4-BE49-F238E27FC236}">
+                <a16:creationId xmlns:a16="http://schemas.microsoft.com/office/drawing/2014/main" id="{891110FB-4E37-031D-14B8-A3D67E2F6645}"/>
+              </a:ext>
+            </a:extLst>
+          </p:cNvPr>
+          <p:cNvSpPr/>
+          <p:nvPr/>
+        </p:nvSpPr>
+        <p:spPr>
+          <a:xfrm>
+            <a:off x="65856" y="269031"/>
+            <a:ext cx="1104929" cy="1056855"/>
+          </a:xfrm>
+          <a:prstGeom prst="ellipse">
+            <a:avLst/>
+          </a:prstGeom>
+          <a:solidFill>
+            <a:schemeClr val="bg2">
+              <a:lumMod val="50000"/>
+              <a:alpha val="70000"/>
+            </a:schemeClr>
+          </a:solidFill>
+          <a:ln>
+            <a:noFill/>
+          </a:ln>
+        </p:spPr>
+        <p:style>
+          <a:lnRef idx="2">
+            <a:schemeClr val="accent1">
+              <a:shade val="15000"/>
+            </a:schemeClr>
+          </a:lnRef>
+          <a:fillRef idx="1">
+            <a:schemeClr val="accent1"/>
+          </a:fillRef>
+          <a:effectRef idx="0">
+            <a:schemeClr val="accent1"/>
+          </a:effectRef>
+          <a:fontRef idx="minor">
+            <a:schemeClr val="lt1"/>
+          </a:fontRef>
+        </p:style>
+        <p:txBody>
+          <a:bodyPr rtlCol="0" anchor="ctr"/>
+          <a:lstStyle/>
+          <a:p>
+            <a:pPr algn="ctr"/>
+            <a:r>
+              <a:rPr lang="en-US" sz="4400" b="1" dirty="0">
+                <a:latin typeface="Montserrat" pitchFamily="2" charset="77"/>
+              </a:rPr>
+              <a:t>4</a:t>
+            </a:r>
+          </a:p>
+        </p:txBody>
+      </p:sp>
+      <p:sp>
+        <p:nvSpPr>
+          <p:cNvPr id="5" name="Espace réservé du texte 2">
+            <a:extLst>
+              <a:ext uri="{FF2B5EF4-FFF2-40B4-BE49-F238E27FC236}">
+                <a16:creationId xmlns:a16="http://schemas.microsoft.com/office/drawing/2014/main" id="{5E3C7B94-A950-61ED-76F5-EA64E099C889}"/>
+              </a:ext>
+            </a:extLst>
+          </p:cNvPr>
+          <p:cNvSpPr>
+            <a:spLocks noGrp="1"/>
+          </p:cNvSpPr>
+          <p:nvPr>
+            <p:ph type="body" sz="quarter" idx="14"/>
+          </p:nvPr>
+        </p:nvSpPr>
+        <p:spPr>
+          <a:xfrm>
+            <a:off x="842542" y="334748"/>
+            <a:ext cx="8555058" cy="923925"/>
+          </a:xfrm>
+        </p:spPr>
+        <p:txBody>
+          <a:bodyPr/>
+          <a:lstStyle/>
+          <a:p>
+            <a:r>
+              <a:rPr lang="en-US" dirty="0">
+                <a:solidFill>
+                  <a:srgbClr val="002060"/>
+                </a:solidFill>
+              </a:rPr>
+              <a:t>Product management Information </a:t>
+            </a:r>
+            <a:br>
+              <a:rPr lang="en-US" dirty="0">
+                <a:solidFill>
+                  <a:srgbClr val="002060"/>
+                </a:solidFill>
+              </a:rPr>
+            </a:br>
+            <a:r>
+              <a:rPr lang="en-US" sz="2400" dirty="0">
+                <a:solidFill>
+                  <a:srgbClr val="002060"/>
+                </a:solidFill>
+              </a:rPr>
+              <a:t>Rules</a:t>
+            </a:r>
+            <a:endParaRPr lang="en-US" dirty="0">
+              <a:solidFill>
+                <a:srgbClr val="002060"/>
+              </a:solidFill>
+            </a:endParaRPr>
+          </a:p>
+        </p:txBody>
+      </p:sp>
+      <p:sp>
+        <p:nvSpPr>
+          <p:cNvPr id="2" name="ZoneTexte 1">
+            <a:extLst>
+              <a:ext uri="{FF2B5EF4-FFF2-40B4-BE49-F238E27FC236}">
+                <a16:creationId xmlns:a16="http://schemas.microsoft.com/office/drawing/2014/main" id="{A20812FF-7662-587B-BAA0-CEBAC14C3275}"/>
+              </a:ext>
+            </a:extLst>
+          </p:cNvPr>
+          <p:cNvSpPr txBox="1"/>
+          <p:nvPr/>
+        </p:nvSpPr>
+        <p:spPr>
+          <a:xfrm>
+            <a:off x="1626887" y="2017339"/>
+            <a:ext cx="7750793" cy="2031325"/>
+          </a:xfrm>
+          <a:prstGeom prst="rect">
+            <a:avLst/>
+          </a:prstGeom>
+          <a:noFill/>
+        </p:spPr>
+        <p:txBody>
+          <a:bodyPr wrap="square" rtlCol="0">
+            <a:spAutoFit/>
+          </a:bodyPr>
+          <a:lstStyle/>
+          <a:p>
+            <a:r>
+              <a:rPr lang="en-US" dirty="0"/>
+              <a:t>Illustrate a rule on the product</a:t>
+            </a:r>
+          </a:p>
+          <a:p>
+            <a:r>
+              <a:rPr lang="en-US" dirty="0"/>
+              <a:t>CDG – YUL ( channel etc. … ) illustrating the supplier's point of view to be considered by a retailer in order to know if he can reasonable y ask for that product with a high degree of probability to obtain a positive answers.</a:t>
+            </a:r>
+          </a:p>
+          <a:p>
+            <a:r>
+              <a:rPr lang="en-US" dirty="0"/>
+              <a:t>Remark: The only leftover uncertainty should be the availability of the product ( i.e. stock ) as this is not communicated by a supplier to a retailer in all cases. </a:t>
+            </a:r>
+          </a:p>
+        </p:txBody>
+      </p:sp>
+    </p:spTree>
+    <p:extLst>
+      <p:ext uri="{BB962C8B-B14F-4D97-AF65-F5344CB8AC3E}">
+        <p14:creationId xmlns:p14="http://schemas.microsoft.com/office/powerpoint/2010/main" val="167752442"/>
+      </p:ext>
+    </p:extLst>
+  </p:cSld>
+  <p:clrMapOvr>
+    <a:masterClrMapping/>
+  </p:clrMapOvr>
+</p:sld>
+</file>
+
+<file path=ppt/slides/slide8.xml><?xml version="1.0" encoding="utf-8"?>
+<p:sld xmlns:a="http://schemas.openxmlformats.org/drawingml/2006/main" xmlns:r="http://schemas.openxmlformats.org/officeDocument/2006/relationships" xmlns:p="http://schemas.openxmlformats.org/presentationml/2006/main">
+  <p:cSld>
+    <p:spTree>
+      <p:nvGrpSpPr>
+        <p:cNvPr id="1" name="">
+          <a:extLst>
+            <a:ext uri="{FF2B5EF4-FFF2-40B4-BE49-F238E27FC236}">
+              <a16:creationId xmlns:a16="http://schemas.microsoft.com/office/drawing/2014/main" id="{68D2245A-2505-B187-FF86-90251A81D6B1}"/>
+            </a:ext>
+          </a:extLst>
+        </p:cNvPr>
+        <p:cNvGrpSpPr/>
+        <p:nvPr/>
+      </p:nvGrpSpPr>
+      <p:grpSpPr>
+        <a:xfrm>
+          <a:off x="0" y="0"/>
+          <a:ext cx="0" cy="0"/>
+          <a:chOff x="0" y="0"/>
+          <a:chExt cx="0" cy="0"/>
+        </a:xfrm>
+      </p:grpSpPr>
+      <p:sp>
+        <p:nvSpPr>
+          <p:cNvPr id="6" name="Ellipse 5">
+            <a:extLst>
+              <a:ext uri="{FF2B5EF4-FFF2-40B4-BE49-F238E27FC236}">
+                <a16:creationId xmlns:a16="http://schemas.microsoft.com/office/drawing/2014/main" id="{C566798D-2288-4204-CFB9-03D1226F87FC}"/>
+              </a:ext>
+            </a:extLst>
+          </p:cNvPr>
+          <p:cNvSpPr/>
+          <p:nvPr/>
+        </p:nvSpPr>
+        <p:spPr>
+          <a:xfrm>
+            <a:off x="65856" y="269031"/>
+            <a:ext cx="1104929" cy="1056855"/>
+          </a:xfrm>
+          <a:prstGeom prst="ellipse">
+            <a:avLst/>
+          </a:prstGeom>
+          <a:solidFill>
+            <a:schemeClr val="bg2">
+              <a:lumMod val="50000"/>
+              <a:alpha val="70000"/>
+            </a:schemeClr>
+          </a:solidFill>
+          <a:ln>
+            <a:noFill/>
+          </a:ln>
+        </p:spPr>
+        <p:style>
+          <a:lnRef idx="2">
+            <a:schemeClr val="accent1">
+              <a:shade val="15000"/>
+            </a:schemeClr>
+          </a:lnRef>
+          <a:fillRef idx="1">
+            <a:schemeClr val="accent1"/>
+          </a:fillRef>
+          <a:effectRef idx="0">
+            <a:schemeClr val="accent1"/>
+          </a:effectRef>
+          <a:fontRef idx="minor">
+            <a:schemeClr val="lt1"/>
+          </a:fontRef>
+        </p:style>
+        <p:txBody>
+          <a:bodyPr rtlCol="0" anchor="ctr"/>
+          <a:lstStyle/>
+          <a:p>
+            <a:pPr algn="ctr"/>
+            <a:r>
+              <a:rPr lang="en-US" sz="4400" b="1" dirty="0">
+                <a:latin typeface="Montserrat" pitchFamily="2" charset="77"/>
+              </a:rPr>
+              <a:t>5</a:t>
+            </a:r>
+          </a:p>
+        </p:txBody>
+      </p:sp>
+      <p:sp>
+        <p:nvSpPr>
+          <p:cNvPr id="5" name="Espace réservé du texte 2">
+            <a:extLst>
+              <a:ext uri="{FF2B5EF4-FFF2-40B4-BE49-F238E27FC236}">
+                <a16:creationId xmlns:a16="http://schemas.microsoft.com/office/drawing/2014/main" id="{027037BB-D412-563A-D4BA-E103F605D2CC}"/>
+              </a:ext>
+            </a:extLst>
+          </p:cNvPr>
+          <p:cNvSpPr>
+            <a:spLocks noGrp="1"/>
+          </p:cNvSpPr>
+          <p:nvPr>
+            <p:ph type="body" sz="quarter" idx="14"/>
+          </p:nvPr>
+        </p:nvSpPr>
+        <p:spPr>
+          <a:xfrm>
+            <a:off x="842542" y="334748"/>
+            <a:ext cx="8555058" cy="923925"/>
+          </a:xfrm>
+        </p:spPr>
+        <p:txBody>
+          <a:bodyPr/>
+          <a:lstStyle/>
+          <a:p>
+            <a:r>
+              <a:rPr lang="en-US" dirty="0">
+                <a:solidFill>
+                  <a:srgbClr val="002060"/>
+                </a:solidFill>
+              </a:rPr>
+              <a:t>Product management Information </a:t>
+            </a:r>
+            <a:br>
+              <a:rPr lang="en-US" dirty="0">
+                <a:solidFill>
+                  <a:srgbClr val="002060"/>
+                </a:solidFill>
+              </a:rPr>
+            </a:br>
+            <a:r>
+              <a:rPr lang="en-US" sz="2400" dirty="0">
+                <a:solidFill>
+                  <a:srgbClr val="002060"/>
+                </a:solidFill>
+              </a:rPr>
+              <a:t>Taxonomy</a:t>
+            </a:r>
+            <a:endParaRPr lang="en-US" dirty="0">
+              <a:solidFill>
+                <a:srgbClr val="002060"/>
+              </a:solidFill>
+            </a:endParaRPr>
+          </a:p>
+        </p:txBody>
+      </p:sp>
+    </p:spTree>
+    <p:extLst>
+      <p:ext uri="{BB962C8B-B14F-4D97-AF65-F5344CB8AC3E}">
+        <p14:creationId xmlns:p14="http://schemas.microsoft.com/office/powerpoint/2010/main" val="2847598795"/>
+      </p:ext>
+    </p:extLst>
+  </p:cSld>
+  <p:clrMapOvr>
+    <a:masterClrMapping/>
+  </p:clrMapOvr>
+</p:sld>
+</file>
+
+<file path=ppt/slides/slide9.xml><?xml version="1.0" encoding="utf-8"?>
 <p:sld xmlns:a="http://schemas.openxmlformats.org/drawingml/2006/main" xmlns:r="http://schemas.openxmlformats.org/officeDocument/2006/relationships" xmlns:p="http://schemas.openxmlformats.org/presentationml/2006/main">
   <p:cSld>
     <p:spTree>
@@ -33930,8 +34835,8 @@
         </p:nvSpPr>
         <p:spPr>
           <a:xfrm>
-            <a:off x="874451" y="2032026"/>
-            <a:ext cx="5402062" cy="1938992"/>
+            <a:off x="762690" y="2631466"/>
+            <a:ext cx="10555549" cy="1200329"/>
           </a:xfrm>
           <a:prstGeom prst="rect">
             <a:avLst/>
@@ -34005,506 +34910,6 @@
     <p:extLst>
       <p:ext uri="{BB962C8B-B14F-4D97-AF65-F5344CB8AC3E}">
         <p14:creationId xmlns:p14="http://schemas.microsoft.com/office/powerpoint/2010/main" val="909290669"/>
-      </p:ext>
-    </p:extLst>
-  </p:cSld>
-  <p:clrMapOvr>
-    <a:masterClrMapping/>
-  </p:clrMapOvr>
-</p:sld>
-</file>
-
-<file path=ppt/slides/slide7.xml><?xml version="1.0" encoding="utf-8"?>
-<p:sld xmlns:a="http://schemas.openxmlformats.org/drawingml/2006/main" xmlns:r="http://schemas.openxmlformats.org/officeDocument/2006/relationships" xmlns:p="http://schemas.openxmlformats.org/presentationml/2006/main">
-  <p:cSld>
-    <p:spTree>
-      <p:nvGrpSpPr>
-        <p:cNvPr id="1" name="">
-          <a:extLst>
-            <a:ext uri="{FF2B5EF4-FFF2-40B4-BE49-F238E27FC236}">
-              <a16:creationId xmlns:a16="http://schemas.microsoft.com/office/drawing/2014/main" id="{457ED318-2E00-08A3-F6CD-30754C3FAFF3}"/>
-            </a:ext>
-          </a:extLst>
-        </p:cNvPr>
-        <p:cNvGrpSpPr/>
-        <p:nvPr/>
-      </p:nvGrpSpPr>
-      <p:grpSpPr>
-        <a:xfrm>
-          <a:off x="0" y="0"/>
-          <a:ext cx="0" cy="0"/>
-          <a:chOff x="0" y="0"/>
-          <a:chExt cx="0" cy="0"/>
-        </a:xfrm>
-      </p:grpSpPr>
-      <p:sp>
-        <p:nvSpPr>
-          <p:cNvPr id="6" name="Ellipse 5">
-            <a:extLst>
-              <a:ext uri="{FF2B5EF4-FFF2-40B4-BE49-F238E27FC236}">
-                <a16:creationId xmlns:a16="http://schemas.microsoft.com/office/drawing/2014/main" id="{88C0F3DE-D9B9-5F05-216B-79FA3DFC51DA}"/>
-              </a:ext>
-            </a:extLst>
-          </p:cNvPr>
-          <p:cNvSpPr/>
-          <p:nvPr/>
-        </p:nvSpPr>
-        <p:spPr>
-          <a:xfrm>
-            <a:off x="65856" y="269031"/>
-            <a:ext cx="1104929" cy="1056855"/>
-          </a:xfrm>
-          <a:prstGeom prst="ellipse">
-            <a:avLst/>
-          </a:prstGeom>
-          <a:solidFill>
-            <a:schemeClr val="accent2">
-              <a:lumMod val="25000"/>
-              <a:alpha val="70000"/>
-            </a:schemeClr>
-          </a:solidFill>
-          <a:ln>
-            <a:noFill/>
-          </a:ln>
-        </p:spPr>
-        <p:style>
-          <a:lnRef idx="2">
-            <a:schemeClr val="accent1">
-              <a:shade val="15000"/>
-            </a:schemeClr>
-          </a:lnRef>
-          <a:fillRef idx="1">
-            <a:schemeClr val="accent1"/>
-          </a:fillRef>
-          <a:effectRef idx="0">
-            <a:schemeClr val="accent1"/>
-          </a:effectRef>
-          <a:fontRef idx="minor">
-            <a:schemeClr val="lt1"/>
-          </a:fontRef>
-        </p:style>
-        <p:txBody>
-          <a:bodyPr rtlCol="0" anchor="ctr"/>
-          <a:lstStyle/>
-          <a:p>
-            <a:pPr algn="ctr"/>
-            <a:r>
-              <a:rPr lang="en-US" sz="4400" b="1" dirty="0">
-                <a:latin typeface="Montserrat" pitchFamily="2" charset="77"/>
-              </a:rPr>
-              <a:t>3</a:t>
-            </a:r>
-          </a:p>
-        </p:txBody>
-      </p:sp>
-      <p:sp>
-        <p:nvSpPr>
-          <p:cNvPr id="5" name="Espace réservé du texte 2">
-            <a:extLst>
-              <a:ext uri="{FF2B5EF4-FFF2-40B4-BE49-F238E27FC236}">
-                <a16:creationId xmlns:a16="http://schemas.microsoft.com/office/drawing/2014/main" id="{6863199F-888A-DCDC-DF7F-1A8A898E309D}"/>
-              </a:ext>
-            </a:extLst>
-          </p:cNvPr>
-          <p:cNvSpPr>
-            <a:spLocks noGrp="1"/>
-          </p:cNvSpPr>
-          <p:nvPr>
-            <p:ph type="body" sz="quarter" idx="14"/>
-          </p:nvPr>
-        </p:nvSpPr>
-        <p:spPr>
-          <a:xfrm>
-            <a:off x="842542" y="334748"/>
-            <a:ext cx="8555058" cy="923925"/>
-          </a:xfrm>
-        </p:spPr>
-        <p:txBody>
-          <a:bodyPr/>
-          <a:lstStyle/>
-          <a:p>
-            <a:r>
-              <a:rPr lang="en-US" dirty="0">
-                <a:solidFill>
-                  <a:srgbClr val="002060"/>
-                </a:solidFill>
-              </a:rPr>
-              <a:t>Product management Information </a:t>
-            </a:r>
-            <a:br>
-              <a:rPr lang="en-US" dirty="0">
-                <a:solidFill>
-                  <a:srgbClr val="002060"/>
-                </a:solidFill>
-              </a:rPr>
-            </a:br>
-            <a:r>
-              <a:rPr lang="en-US" sz="2400" dirty="0">
-                <a:solidFill>
-                  <a:srgbClr val="002060"/>
-                </a:solidFill>
-              </a:rPr>
-              <a:t>Concrete Product</a:t>
-            </a:r>
-            <a:endParaRPr lang="en-US" dirty="0">
-              <a:solidFill>
-                <a:srgbClr val="002060"/>
-              </a:solidFill>
-            </a:endParaRPr>
-          </a:p>
-        </p:txBody>
-      </p:sp>
-      <p:sp>
-        <p:nvSpPr>
-          <p:cNvPr id="4" name="ZoneTexte 3">
-            <a:extLst>
-              <a:ext uri="{FF2B5EF4-FFF2-40B4-BE49-F238E27FC236}">
-                <a16:creationId xmlns:a16="http://schemas.microsoft.com/office/drawing/2014/main" id="{D5C23778-451B-DB4D-1518-74662329E61C}"/>
-              </a:ext>
-            </a:extLst>
-          </p:cNvPr>
-          <p:cNvSpPr txBox="1"/>
-          <p:nvPr/>
-        </p:nvSpPr>
-        <p:spPr>
-          <a:xfrm>
-            <a:off x="4166886" y="3703899"/>
-            <a:ext cx="1997085" cy="646331"/>
-          </a:xfrm>
-          <a:prstGeom prst="rect">
-            <a:avLst/>
-          </a:prstGeom>
-          <a:noFill/>
-        </p:spPr>
-        <p:txBody>
-          <a:bodyPr wrap="none" rtlCol="0">
-            <a:spAutoFit/>
-          </a:bodyPr>
-          <a:lstStyle/>
-          <a:p>
-            <a:r>
-              <a:rPr lang="en-US" dirty="0"/>
-              <a:t>Transport product</a:t>
-            </a:r>
-          </a:p>
-          <a:p>
-            <a:r>
-              <a:rPr lang="en-US" dirty="0"/>
-              <a:t>CDG - YUL</a:t>
-            </a:r>
-          </a:p>
-        </p:txBody>
-      </p:sp>
-    </p:spTree>
-    <p:extLst>
-      <p:ext uri="{BB962C8B-B14F-4D97-AF65-F5344CB8AC3E}">
-        <p14:creationId xmlns:p14="http://schemas.microsoft.com/office/powerpoint/2010/main" val="1819057470"/>
-      </p:ext>
-    </p:extLst>
-  </p:cSld>
-  <p:clrMapOvr>
-    <a:masterClrMapping/>
-  </p:clrMapOvr>
-</p:sld>
-</file>
-
-<file path=ppt/slides/slide8.xml><?xml version="1.0" encoding="utf-8"?>
-<p:sld xmlns:a="http://schemas.openxmlformats.org/drawingml/2006/main" xmlns:r="http://schemas.openxmlformats.org/officeDocument/2006/relationships" xmlns:p="http://schemas.openxmlformats.org/presentationml/2006/main">
-  <p:cSld>
-    <p:spTree>
-      <p:nvGrpSpPr>
-        <p:cNvPr id="1" name="">
-          <a:extLst>
-            <a:ext uri="{FF2B5EF4-FFF2-40B4-BE49-F238E27FC236}">
-              <a16:creationId xmlns:a16="http://schemas.microsoft.com/office/drawing/2014/main" id="{7F5272A3-82BA-5D2E-84C3-EA6BBBAE79F6}"/>
-            </a:ext>
-          </a:extLst>
-        </p:cNvPr>
-        <p:cNvGrpSpPr/>
-        <p:nvPr/>
-      </p:nvGrpSpPr>
-      <p:grpSpPr>
-        <a:xfrm>
-          <a:off x="0" y="0"/>
-          <a:ext cx="0" cy="0"/>
-          <a:chOff x="0" y="0"/>
-          <a:chExt cx="0" cy="0"/>
-        </a:xfrm>
-      </p:grpSpPr>
-      <p:sp>
-        <p:nvSpPr>
-          <p:cNvPr id="6" name="Ellipse 5">
-            <a:extLst>
-              <a:ext uri="{FF2B5EF4-FFF2-40B4-BE49-F238E27FC236}">
-                <a16:creationId xmlns:a16="http://schemas.microsoft.com/office/drawing/2014/main" id="{891110FB-4E37-031D-14B8-A3D67E2F6645}"/>
-              </a:ext>
-            </a:extLst>
-          </p:cNvPr>
-          <p:cNvSpPr/>
-          <p:nvPr/>
-        </p:nvSpPr>
-        <p:spPr>
-          <a:xfrm>
-            <a:off x="65856" y="269031"/>
-            <a:ext cx="1104929" cy="1056855"/>
-          </a:xfrm>
-          <a:prstGeom prst="ellipse">
-            <a:avLst/>
-          </a:prstGeom>
-          <a:solidFill>
-            <a:schemeClr val="bg2">
-              <a:lumMod val="50000"/>
-              <a:alpha val="70000"/>
-            </a:schemeClr>
-          </a:solidFill>
-          <a:ln>
-            <a:noFill/>
-          </a:ln>
-        </p:spPr>
-        <p:style>
-          <a:lnRef idx="2">
-            <a:schemeClr val="accent1">
-              <a:shade val="15000"/>
-            </a:schemeClr>
-          </a:lnRef>
-          <a:fillRef idx="1">
-            <a:schemeClr val="accent1"/>
-          </a:fillRef>
-          <a:effectRef idx="0">
-            <a:schemeClr val="accent1"/>
-          </a:effectRef>
-          <a:fontRef idx="minor">
-            <a:schemeClr val="lt1"/>
-          </a:fontRef>
-        </p:style>
-        <p:txBody>
-          <a:bodyPr rtlCol="0" anchor="ctr"/>
-          <a:lstStyle/>
-          <a:p>
-            <a:pPr algn="ctr"/>
-            <a:r>
-              <a:rPr lang="en-US" sz="4400" b="1" dirty="0">
-                <a:latin typeface="Montserrat" pitchFamily="2" charset="77"/>
-              </a:rPr>
-              <a:t>4</a:t>
-            </a:r>
-          </a:p>
-        </p:txBody>
-      </p:sp>
-      <p:sp>
-        <p:nvSpPr>
-          <p:cNvPr id="5" name="Espace réservé du texte 2">
-            <a:extLst>
-              <a:ext uri="{FF2B5EF4-FFF2-40B4-BE49-F238E27FC236}">
-                <a16:creationId xmlns:a16="http://schemas.microsoft.com/office/drawing/2014/main" id="{5E3C7B94-A950-61ED-76F5-EA64E099C889}"/>
-              </a:ext>
-            </a:extLst>
-          </p:cNvPr>
-          <p:cNvSpPr>
-            <a:spLocks noGrp="1"/>
-          </p:cNvSpPr>
-          <p:nvPr>
-            <p:ph type="body" sz="quarter" idx="14"/>
-          </p:nvPr>
-        </p:nvSpPr>
-        <p:spPr>
-          <a:xfrm>
-            <a:off x="842542" y="334748"/>
-            <a:ext cx="8555058" cy="923925"/>
-          </a:xfrm>
-        </p:spPr>
-        <p:txBody>
-          <a:bodyPr/>
-          <a:lstStyle/>
-          <a:p>
-            <a:r>
-              <a:rPr lang="en-US" dirty="0">
-                <a:solidFill>
-                  <a:srgbClr val="002060"/>
-                </a:solidFill>
-              </a:rPr>
-              <a:t>Product management Information </a:t>
-            </a:r>
-            <a:br>
-              <a:rPr lang="en-US" dirty="0">
-                <a:solidFill>
-                  <a:srgbClr val="002060"/>
-                </a:solidFill>
-              </a:rPr>
-            </a:br>
-            <a:r>
-              <a:rPr lang="en-US" sz="2400" dirty="0">
-                <a:solidFill>
-                  <a:srgbClr val="002060"/>
-                </a:solidFill>
-              </a:rPr>
-              <a:t>Rules</a:t>
-            </a:r>
-            <a:endParaRPr lang="en-US" dirty="0">
-              <a:solidFill>
-                <a:srgbClr val="002060"/>
-              </a:solidFill>
-            </a:endParaRPr>
-          </a:p>
-        </p:txBody>
-      </p:sp>
-    </p:spTree>
-    <p:extLst>
-      <p:ext uri="{BB962C8B-B14F-4D97-AF65-F5344CB8AC3E}">
-        <p14:creationId xmlns:p14="http://schemas.microsoft.com/office/powerpoint/2010/main" val="167752442"/>
-      </p:ext>
-    </p:extLst>
-  </p:cSld>
-  <p:clrMapOvr>
-    <a:masterClrMapping/>
-  </p:clrMapOvr>
-</p:sld>
-</file>
-
-<file path=ppt/slides/slide9.xml><?xml version="1.0" encoding="utf-8"?>
-<p:sld xmlns:a="http://schemas.openxmlformats.org/drawingml/2006/main" xmlns:r="http://schemas.openxmlformats.org/officeDocument/2006/relationships" xmlns:p="http://schemas.openxmlformats.org/presentationml/2006/main">
-  <p:cSld>
-    <p:spTree>
-      <p:nvGrpSpPr>
-        <p:cNvPr id="1" name="">
-          <a:extLst>
-            <a:ext uri="{FF2B5EF4-FFF2-40B4-BE49-F238E27FC236}">
-              <a16:creationId xmlns:a16="http://schemas.microsoft.com/office/drawing/2014/main" id="{68D2245A-2505-B187-FF86-90251A81D6B1}"/>
-            </a:ext>
-          </a:extLst>
-        </p:cNvPr>
-        <p:cNvGrpSpPr/>
-        <p:nvPr/>
-      </p:nvGrpSpPr>
-      <p:grpSpPr>
-        <a:xfrm>
-          <a:off x="0" y="0"/>
-          <a:ext cx="0" cy="0"/>
-          <a:chOff x="0" y="0"/>
-          <a:chExt cx="0" cy="0"/>
-        </a:xfrm>
-      </p:grpSpPr>
-      <p:sp>
-        <p:nvSpPr>
-          <p:cNvPr id="6" name="Ellipse 5">
-            <a:extLst>
-              <a:ext uri="{FF2B5EF4-FFF2-40B4-BE49-F238E27FC236}">
-                <a16:creationId xmlns:a16="http://schemas.microsoft.com/office/drawing/2014/main" id="{C566798D-2288-4204-CFB9-03D1226F87FC}"/>
-              </a:ext>
-            </a:extLst>
-          </p:cNvPr>
-          <p:cNvSpPr/>
-          <p:nvPr/>
-        </p:nvSpPr>
-        <p:spPr>
-          <a:xfrm>
-            <a:off x="65856" y="269031"/>
-            <a:ext cx="1104929" cy="1056855"/>
-          </a:xfrm>
-          <a:prstGeom prst="ellipse">
-            <a:avLst/>
-          </a:prstGeom>
-          <a:solidFill>
-            <a:schemeClr val="bg2">
-              <a:lumMod val="50000"/>
-              <a:alpha val="70000"/>
-            </a:schemeClr>
-          </a:solidFill>
-          <a:ln>
-            <a:noFill/>
-          </a:ln>
-        </p:spPr>
-        <p:style>
-          <a:lnRef idx="2">
-            <a:schemeClr val="accent1">
-              <a:shade val="15000"/>
-            </a:schemeClr>
-          </a:lnRef>
-          <a:fillRef idx="1">
-            <a:schemeClr val="accent1"/>
-          </a:fillRef>
-          <a:effectRef idx="0">
-            <a:schemeClr val="accent1"/>
-          </a:effectRef>
-          <a:fontRef idx="minor">
-            <a:schemeClr val="lt1"/>
-          </a:fontRef>
-        </p:style>
-        <p:txBody>
-          <a:bodyPr rtlCol="0" anchor="ctr"/>
-          <a:lstStyle/>
-          <a:p>
-            <a:pPr algn="ctr"/>
-            <a:r>
-              <a:rPr lang="en-US" sz="4400" b="1" dirty="0">
-                <a:latin typeface="Montserrat" pitchFamily="2" charset="77"/>
-              </a:rPr>
-              <a:t>5</a:t>
-            </a:r>
-          </a:p>
-        </p:txBody>
-      </p:sp>
-      <p:sp>
-        <p:nvSpPr>
-          <p:cNvPr id="5" name="Espace réservé du texte 2">
-            <a:extLst>
-              <a:ext uri="{FF2B5EF4-FFF2-40B4-BE49-F238E27FC236}">
-                <a16:creationId xmlns:a16="http://schemas.microsoft.com/office/drawing/2014/main" id="{027037BB-D412-563A-D4BA-E103F605D2CC}"/>
-              </a:ext>
-            </a:extLst>
-          </p:cNvPr>
-          <p:cNvSpPr>
-            <a:spLocks noGrp="1"/>
-          </p:cNvSpPr>
-          <p:nvPr>
-            <p:ph type="body" sz="quarter" idx="14"/>
-          </p:nvPr>
-        </p:nvSpPr>
-        <p:spPr>
-          <a:xfrm>
-            <a:off x="842542" y="334748"/>
-            <a:ext cx="8555058" cy="923925"/>
-          </a:xfrm>
-        </p:spPr>
-        <p:txBody>
-          <a:bodyPr/>
-          <a:lstStyle/>
-          <a:p>
-            <a:r>
-              <a:rPr lang="en-US" dirty="0">
-                <a:solidFill>
-                  <a:srgbClr val="002060"/>
-                </a:solidFill>
-              </a:rPr>
-              <a:t>Product management Information </a:t>
-            </a:r>
-            <a:br>
-              <a:rPr lang="en-US" dirty="0">
-                <a:solidFill>
-                  <a:srgbClr val="002060"/>
-                </a:solidFill>
-              </a:rPr>
-            </a:br>
-            <a:r>
-              <a:rPr lang="en-US" sz="2400" dirty="0">
-                <a:solidFill>
-                  <a:srgbClr val="002060"/>
-                </a:solidFill>
-              </a:rPr>
-              <a:t>Taxonomy</a:t>
-            </a:r>
-            <a:endParaRPr lang="en-US" dirty="0">
-              <a:solidFill>
-                <a:srgbClr val="002060"/>
-              </a:solidFill>
-            </a:endParaRPr>
-          </a:p>
-        </p:txBody>
-      </p:sp>
-    </p:spTree>
-    <p:extLst>
-      <p:ext uri="{BB962C8B-B14F-4D97-AF65-F5344CB8AC3E}">
-        <p14:creationId xmlns:p14="http://schemas.microsoft.com/office/powerpoint/2010/main" val="2847598795"/>
       </p:ext>
     </p:extLst>
   </p:cSld>

</xml_diff>